<commit_message>
docs: some little changes
</commit_message>
<xml_diff>
--- a/presentation/BP-prezentácia.pptx
+++ b/presentation/BP-prezentácia.pptx
@@ -10797,6 +10797,23 @@
               <a:buChar char="-"/>
             </a:pPr>
             <a:r>
+              <a:rPr lang="sk-SK"/>
+              <a:t>Optimalizácia kódu</a:t>
+            </a:r>
+            <a:endParaRPr lang="sk-SK" dirty="0"/>
+          </a:p>
+          <a:p>
+            <a:pPr marL="285750" lvl="0" indent="-285750" algn="l" rtl="0">
+              <a:spcBef>
+                <a:spcPts val="600"/>
+              </a:spcBef>
+              <a:spcAft>
+                <a:spcPts val="0"/>
+              </a:spcAft>
+              <a:buFontTx/>
+              <a:buChar char="-"/>
+            </a:pPr>
+            <a:r>
               <a:rPr lang="sk-SK" dirty="0"/>
               <a:t>Vizuálna úprava kabeláže</a:t>
             </a:r>

</xml_diff>

<commit_message>
docs: readme add vozidlo and little changes in code
</commit_message>
<xml_diff>
--- a/presentation/BP-prezentácia.pptx
+++ b/presentation/BP-prezentácia.pptx
@@ -10726,7 +10726,7 @@
             </a:pPr>
             <a:r>
               <a:rPr lang="sk-SK" dirty="0"/>
-              <a:t>Pripojiť display</a:t>
+              <a:t>Optimalizovať display</a:t>
             </a:r>
           </a:p>
           <a:p>
@@ -10742,7 +10742,7 @@
             </a:pPr>
             <a:r>
               <a:rPr lang="sk-SK" dirty="0"/>
-              <a:t>Pripojiť predný senzor</a:t>
+              <a:t>Predný senzor program</a:t>
             </a:r>
           </a:p>
           <a:p>
@@ -10846,13 +10846,8 @@
             </a:pPr>
             <a:r>
               <a:rPr lang="sk-SK" dirty="0"/>
-              <a:t>Grafické znázornenie </a:t>
+              <a:t>Grafické znázornenie SVM </a:t>
             </a:r>
-            <a:r>
-              <a:rPr lang="sk-SK"/>
-              <a:t>SVM </a:t>
-            </a:r>
-            <a:endParaRPr lang="sk-SK" dirty="0"/>
           </a:p>
           <a:p>
             <a:pPr marL="285750" lvl="0" indent="-285750" algn="l" rtl="0">

</xml_diff>